<commit_message>
Add some content to the revision control section
</commit_message>
<xml_diff>
--- a/Day1_AM/Computer_Setup_and_RevisionControl.pptx
+++ b/Day1_AM/Computer_Setup_and_RevisionControl.pptx
@@ -305,7 +305,7 @@
           <a:p>
             <a:fld id="{6464FF7A-8C0F-48D3-B78D-C256EBC8221F}" type="datetimeFigureOut">
               <a:rPr lang="en-US" smtClean="0"/>
-              <a:t>7/7/2016</a:t>
+              <a:t>7/8/2016</a:t>
             </a:fld>
             <a:endParaRPr lang="en-US" dirty="0"/>
           </a:p>
@@ -470,7 +470,7 @@
           <a:p>
             <a:fld id="{6464FF7A-8C0F-48D3-B78D-C256EBC8221F}" type="datetimeFigureOut">
               <a:rPr lang="en-US" smtClean="0"/>
-              <a:t>7/7/2016</a:t>
+              <a:t>7/8/2016</a:t>
             </a:fld>
             <a:endParaRPr lang="en-US" dirty="0"/>
           </a:p>
@@ -645,7 +645,7 @@
           <a:p>
             <a:fld id="{6464FF7A-8C0F-48D3-B78D-C256EBC8221F}" type="datetimeFigureOut">
               <a:rPr lang="en-US" smtClean="0"/>
-              <a:t>7/7/2016</a:t>
+              <a:t>7/8/2016</a:t>
             </a:fld>
             <a:endParaRPr lang="en-US" dirty="0"/>
           </a:p>
@@ -810,7 +810,7 @@
           <a:p>
             <a:fld id="{6464FF7A-8C0F-48D3-B78D-C256EBC8221F}" type="datetimeFigureOut">
               <a:rPr lang="en-US" smtClean="0"/>
-              <a:t>7/7/2016</a:t>
+              <a:t>7/8/2016</a:t>
             </a:fld>
             <a:endParaRPr lang="en-US" dirty="0"/>
           </a:p>
@@ -1051,7 +1051,7 @@
           <a:p>
             <a:fld id="{6464FF7A-8C0F-48D3-B78D-C256EBC8221F}" type="datetimeFigureOut">
               <a:rPr lang="en-US" smtClean="0"/>
-              <a:t>7/7/2016</a:t>
+              <a:t>7/8/2016</a:t>
             </a:fld>
             <a:endParaRPr lang="en-US" dirty="0"/>
           </a:p>
@@ -1334,7 +1334,7 @@
           <a:p>
             <a:fld id="{6464FF7A-8C0F-48D3-B78D-C256EBC8221F}" type="datetimeFigureOut">
               <a:rPr lang="en-US" smtClean="0"/>
-              <a:t>7/7/2016</a:t>
+              <a:t>7/8/2016</a:t>
             </a:fld>
             <a:endParaRPr lang="en-US" dirty="0"/>
           </a:p>
@@ -1763,7 +1763,7 @@
           <a:p>
             <a:fld id="{6464FF7A-8C0F-48D3-B78D-C256EBC8221F}" type="datetimeFigureOut">
               <a:rPr lang="en-US" smtClean="0"/>
-              <a:t>7/7/2016</a:t>
+              <a:t>7/8/2016</a:t>
             </a:fld>
             <a:endParaRPr lang="en-US" dirty="0"/>
           </a:p>
@@ -1876,7 +1876,7 @@
           <a:p>
             <a:fld id="{6464FF7A-8C0F-48D3-B78D-C256EBC8221F}" type="datetimeFigureOut">
               <a:rPr lang="en-US" smtClean="0"/>
-              <a:t>7/7/2016</a:t>
+              <a:t>7/8/2016</a:t>
             </a:fld>
             <a:endParaRPr lang="en-US" dirty="0"/>
           </a:p>
@@ -1966,7 +1966,7 @@
           <a:p>
             <a:fld id="{6464FF7A-8C0F-48D3-B78D-C256EBC8221F}" type="datetimeFigureOut">
               <a:rPr lang="en-US" smtClean="0"/>
-              <a:t>7/7/2016</a:t>
+              <a:t>7/8/2016</a:t>
             </a:fld>
             <a:endParaRPr lang="en-US" dirty="0"/>
           </a:p>
@@ -2155,7 +2155,7 @@
           <a:p>
             <a:fld id="{6464FF7A-8C0F-48D3-B78D-C256EBC8221F}" type="datetimeFigureOut">
               <a:rPr lang="en-US" smtClean="0"/>
-              <a:t>7/7/2016</a:t>
+              <a:t>7/8/2016</a:t>
             </a:fld>
             <a:endParaRPr lang="en-US" dirty="0"/>
           </a:p>
@@ -2473,7 +2473,7 @@
           <a:p>
             <a:fld id="{6464FF7A-8C0F-48D3-B78D-C256EBC8221F}" type="datetimeFigureOut">
               <a:rPr lang="en-US" smtClean="0"/>
-              <a:t>7/7/2016</a:t>
+              <a:t>7/8/2016</a:t>
             </a:fld>
             <a:endParaRPr lang="en-US" dirty="0"/>
           </a:p>
@@ -2852,7 +2852,7 @@
           <a:p>
             <a:fld id="{6464FF7A-8C0F-48D3-B78D-C256EBC8221F}" type="datetimeFigureOut">
               <a:rPr lang="en-US" smtClean="0"/>
-              <a:t>7/7/2016</a:t>
+              <a:t>7/8/2016</a:t>
             </a:fld>
             <a:endParaRPr lang="en-US" dirty="0"/>
           </a:p>
@@ -3217,22 +3217,14 @@
           <a:p>
             <a:r>
               <a:rPr lang="en-US" sz="2400" dirty="0" smtClean="0"/>
-              <a:t>Before getting into the modeling, we need to set up the directory structure and paths</a:t>
-            </a:r>
+              <a:t>Before getting into the modeling, we need to set up the directory structure and paths.</a:t>
+            </a:r>
+            <a:endParaRPr lang="en-US" sz="2400" dirty="0"/>
+          </a:p>
+          <a:p>
             <a:r>
               <a:rPr lang="en-US" sz="2400" dirty="0" smtClean="0"/>
-              <a:t>.</a:t>
-            </a:r>
-            <a:endParaRPr lang="en-US" sz="2400" dirty="0"/>
-          </a:p>
-          <a:p>
-            <a:r>
-              <a:rPr lang="en-US" sz="2400" dirty="0" smtClean="0"/>
-              <a:t>First, update the machine </a:t>
-            </a:r>
-            <a:r>
-              <a:rPr lang="en-US" sz="2400" dirty="0" smtClean="0"/>
-              <a:t>and install </a:t>
+              <a:t>First, update the machine and install </a:t>
             </a:r>
             <a:r>
               <a:rPr lang="en-US" sz="2400" dirty="0" err="1" smtClean="0"/>
@@ -3314,10 +3306,6 @@
               </a:rPr>
               <a:t>-all</a:t>
             </a:r>
-            <a:endParaRPr lang="en-US" dirty="0" smtClean="0">
-              <a:latin typeface="Courier New" panose="02070309020205020404" pitchFamily="49" charset="0"/>
-              <a:cs typeface="Courier New" panose="02070309020205020404" pitchFamily="49" charset="0"/>
-            </a:endParaRPr>
           </a:p>
         </p:txBody>
       </p:sp>
@@ -3454,14 +3442,7 @@
                 <a:latin typeface="Courier New" panose="02070309020205020404" pitchFamily="49" charset="0"/>
                 <a:cs typeface="Courier New" panose="02070309020205020404" pitchFamily="49" charset="0"/>
               </a:rPr>
-              <a:t>cd </a:t>
-            </a:r>
-            <a:r>
-              <a:rPr lang="en-US" sz="1800" dirty="0" smtClean="0">
-                <a:latin typeface="Courier New" panose="02070309020205020404" pitchFamily="49" charset="0"/>
-                <a:cs typeface="Courier New" panose="02070309020205020404" pitchFamily="49" charset="0"/>
-              </a:rPr>
-              <a:t>PBPK-workshop</a:t>
+              <a:t>cd PBPK-workshop</a:t>
             </a:r>
           </a:p>
         </p:txBody>
@@ -3668,31 +3649,7 @@
               <a:rPr lang="en-US" dirty="0" smtClean="0">
                 <a:cs typeface="Courier New" panose="02070309020205020404" pitchFamily="49" charset="0"/>
               </a:rPr>
-              <a:t>documents, </a:t>
-            </a:r>
-            <a:r>
-              <a:rPr lang="en-US" dirty="0" smtClean="0">
-                <a:cs typeface="Courier New" panose="02070309020205020404" pitchFamily="49" charset="0"/>
-              </a:rPr>
-              <a:t>comparing </a:t>
-            </a:r>
-            <a:r>
-              <a:rPr lang="en-US" dirty="0" smtClean="0">
-                <a:cs typeface="Courier New" panose="02070309020205020404" pitchFamily="49" charset="0"/>
-              </a:rPr>
-              <a:t>file versions, and </a:t>
-            </a:r>
-            <a:r>
-              <a:rPr lang="en-US" dirty="0" smtClean="0">
-                <a:cs typeface="Courier New" panose="02070309020205020404" pitchFamily="49" charset="0"/>
-              </a:rPr>
-              <a:t>returning </a:t>
-            </a:r>
-            <a:r>
-              <a:rPr lang="en-US" dirty="0" smtClean="0">
-                <a:cs typeface="Courier New" panose="02070309020205020404" pitchFamily="49" charset="0"/>
-              </a:rPr>
-              <a:t>to previous versions.</a:t>
+              <a:t>documents, comparing file versions, and returning to previous versions.</a:t>
             </a:r>
             <a:endParaRPr lang="en-US" dirty="0">
               <a:cs typeface="Courier New" panose="02070309020205020404" pitchFamily="49" charset="0"/>
@@ -3742,17 +3699,8 @@
             <a:pPr lvl="1"/>
             <a:r>
               <a:rPr lang="en-US" dirty="0" smtClean="0"/>
-              <a:t>Do work: edit files </a:t>
-            </a:r>
-            <a:r>
-              <a:rPr lang="en-US" dirty="0" smtClean="0"/>
-              <a:t>of interest, </a:t>
-            </a:r>
-            <a:r>
-              <a:rPr lang="en-US" dirty="0" smtClean="0"/>
-              <a:t>test, etc. </a:t>
-            </a:r>
-            <a:endParaRPr lang="en-US" dirty="0" smtClean="0"/>
+              <a:t>Do work: edit files of interest, test, etc. </a:t>
+            </a:r>
           </a:p>
           <a:p>
             <a:pPr lvl="1"/>
@@ -3775,14 +3723,7 @@
                 <a:latin typeface="Courier New" panose="02070309020205020404" pitchFamily="49" charset="0"/>
                 <a:cs typeface="Courier New" panose="02070309020205020404" pitchFamily="49" charset="0"/>
               </a:rPr>
-              <a:t>add </a:t>
-            </a:r>
-            <a:r>
-              <a:rPr lang="en-US" dirty="0" smtClean="0">
-                <a:latin typeface="Courier New" panose="02070309020205020404" pitchFamily="49" charset="0"/>
-                <a:cs typeface="Courier New" panose="02070309020205020404" pitchFamily="49" charset="0"/>
-              </a:rPr>
-              <a:t>-A</a:t>
+              <a:t>add -A</a:t>
             </a:r>
             <a:endParaRPr lang="en-US" dirty="0" smtClean="0"/>
           </a:p>
@@ -3813,31 +3754,7 @@
               <a:rPr lang="en-US" dirty="0" smtClean="0">
                 <a:cs typeface="Courier New" panose="02070309020205020404" pitchFamily="49" charset="0"/>
               </a:rPr>
-              <a:t>If you ‘break’ the model or make a change you can’t recall, you can simply </a:t>
-            </a:r>
-            <a:r>
-              <a:rPr lang="en-US" dirty="0" smtClean="0">
-                <a:cs typeface="Courier New" panose="02070309020205020404" pitchFamily="49" charset="0"/>
-              </a:rPr>
-              <a:t>go back </a:t>
-            </a:r>
-            <a:r>
-              <a:rPr lang="en-US" dirty="0" smtClean="0">
-                <a:cs typeface="Courier New" panose="02070309020205020404" pitchFamily="49" charset="0"/>
-              </a:rPr>
-              <a:t>to </a:t>
-            </a:r>
-            <a:r>
-              <a:rPr lang="en-US" dirty="0" smtClean="0">
-                <a:cs typeface="Courier New" panose="02070309020205020404" pitchFamily="49" charset="0"/>
-              </a:rPr>
-              <a:t>the files in the </a:t>
-            </a:r>
-            <a:r>
-              <a:rPr lang="en-US" dirty="0" smtClean="0">
-                <a:cs typeface="Courier New" panose="02070309020205020404" pitchFamily="49" charset="0"/>
-              </a:rPr>
-              <a:t>last commit:</a:t>
+              <a:t>If you ‘break’ the model or make a change you can’t recall, you can simply go back to the files in the last commit:</a:t>
             </a:r>
           </a:p>
           <a:p>
@@ -3944,14 +3861,74 @@
               <a:rPr lang="en-US" dirty="0" smtClean="0">
                 <a:cs typeface="Courier New" panose="02070309020205020404" pitchFamily="49" charset="0"/>
               </a:rPr>
-              <a:t>Set up a repository and do some preliminary </a:t>
-            </a:r>
-            <a:r>
-              <a:rPr lang="en-US" dirty="0" smtClean="0">
-                <a:cs typeface="Courier New" panose="02070309020205020404" pitchFamily="49" charset="0"/>
-              </a:rPr>
-              <a:t>work</a:t>
-            </a:r>
+              <a:t>Set up a repository and do some preliminary work</a:t>
+            </a:r>
+          </a:p>
+          <a:p>
+            <a:pPr marL="114300" indent="0">
+              <a:buNone/>
+            </a:pPr>
+            <a:r>
+              <a:rPr lang="en-US" dirty="0"/>
+              <a:t>$ </a:t>
+            </a:r>
+            <a:r>
+              <a:rPr lang="en-US" dirty="0" err="1"/>
+              <a:t>git</a:t>
+            </a:r>
+            <a:r>
+              <a:rPr lang="en-US" dirty="0"/>
+              <a:t> </a:t>
+            </a:r>
+            <a:r>
+              <a:rPr lang="en-US" dirty="0" err="1"/>
+              <a:t>config</a:t>
+            </a:r>
+            <a:r>
+              <a:rPr lang="en-US" dirty="0"/>
+              <a:t> --global user.name "John Doe</a:t>
+            </a:r>
+            <a:r>
+              <a:rPr lang="en-US"/>
+              <a:t>" </a:t>
+            </a:r>
+            <a:endParaRPr lang="en-US" smtClean="0"/>
+          </a:p>
+          <a:p>
+            <a:pPr marL="114300" indent="0">
+              <a:buNone/>
+            </a:pPr>
+            <a:r>
+              <a:rPr lang="en-US" smtClean="0"/>
+              <a:t>$ </a:t>
+            </a:r>
+            <a:r>
+              <a:rPr lang="en-US" dirty="0" err="1"/>
+              <a:t>git</a:t>
+            </a:r>
+            <a:r>
+              <a:rPr lang="en-US" dirty="0"/>
+              <a:t> </a:t>
+            </a:r>
+            <a:r>
+              <a:rPr lang="en-US" dirty="0" err="1"/>
+              <a:t>config</a:t>
+            </a:r>
+            <a:r>
+              <a:rPr lang="en-US" dirty="0"/>
+              <a:t> --global </a:t>
+            </a:r>
+            <a:r>
+              <a:rPr lang="en-US" dirty="0" err="1"/>
+              <a:t>user.email</a:t>
+            </a:r>
+            <a:r>
+              <a:rPr lang="en-US" dirty="0"/>
+              <a:t> johndoe@example.com</a:t>
+            </a:r>
+            <a:endParaRPr lang="en-US" u="sng" dirty="0" smtClean="0">
+              <a:cs typeface="Courier New" panose="02070309020205020404" pitchFamily="49" charset="0"/>
+            </a:endParaRPr>
           </a:p>
           <a:p>
             <a:pPr marL="114300" indent="0">
@@ -3986,6 +3963,15 @@
                 <a:latin typeface="Courier New" panose="02070309020205020404" pitchFamily="49" charset="0"/>
                 <a:cs typeface="Courier New" panose="02070309020205020404" pitchFamily="49" charset="0"/>
               </a:rPr>
+              <a:t>status</a:t>
+            </a:r>
+          </a:p>
+          <a:p>
+            <a:r>
+              <a:rPr lang="en-US" dirty="0" smtClean="0">
+                <a:latin typeface="Courier New" panose="02070309020205020404" pitchFamily="49" charset="0"/>
+                <a:cs typeface="Courier New" panose="02070309020205020404" pitchFamily="49" charset="0"/>
+              </a:rPr>
               <a:t>add</a:t>
             </a:r>
           </a:p>
@@ -4004,28 +3990,17 @@
                 <a:latin typeface="Courier New" panose="02070309020205020404" pitchFamily="49" charset="0"/>
                 <a:cs typeface="Courier New" panose="02070309020205020404" pitchFamily="49" charset="0"/>
               </a:rPr>
-              <a:t>b</a:t>
-            </a:r>
+              <a:t>branch</a:t>
+            </a:r>
+          </a:p>
+          <a:p>
             <a:r>
               <a:rPr lang="en-US" dirty="0" smtClean="0">
                 <a:latin typeface="Courier New" panose="02070309020205020404" pitchFamily="49" charset="0"/>
                 <a:cs typeface="Courier New" panose="02070309020205020404" pitchFamily="49" charset="0"/>
               </a:rPr>
-              <a:t>ranch</a:t>
-            </a:r>
-          </a:p>
-          <a:p>
-            <a:r>
-              <a:rPr lang="en-US" smtClean="0">
-                <a:latin typeface="Courier New" panose="02070309020205020404" pitchFamily="49" charset="0"/>
-                <a:cs typeface="Courier New" panose="02070309020205020404" pitchFamily="49" charset="0"/>
-              </a:rPr>
               <a:t>reset</a:t>
             </a:r>
-            <a:endParaRPr lang="en-US" dirty="0" smtClean="0">
-              <a:latin typeface="Courier New" panose="02070309020205020404" pitchFamily="49" charset="0"/>
-              <a:cs typeface="Courier New" panose="02070309020205020404" pitchFamily="49" charset="0"/>
-            </a:endParaRPr>
           </a:p>
           <a:p>
             <a:pPr marL="114300" indent="0">

</xml_diff>

<commit_message>
Update intro slides and make corrections
</commit_message>
<xml_diff>
--- a/Day1_AM/Computer_Setup_and_RevisionControl.pptx
+++ b/Day1_AM/Computer_Setup_and_RevisionControl.pptx
@@ -305,7 +305,7 @@
           <a:p>
             <a:fld id="{6464FF7A-8C0F-48D3-B78D-C256EBC8221F}" type="datetimeFigureOut">
               <a:rPr lang="en-US" smtClean="0"/>
-              <a:t>7/8/2016</a:t>
+              <a:t>7/9/2016</a:t>
             </a:fld>
             <a:endParaRPr lang="en-US" dirty="0"/>
           </a:p>
@@ -470,7 +470,7 @@
           <a:p>
             <a:fld id="{6464FF7A-8C0F-48D3-B78D-C256EBC8221F}" type="datetimeFigureOut">
               <a:rPr lang="en-US" smtClean="0"/>
-              <a:t>7/8/2016</a:t>
+              <a:t>7/9/2016</a:t>
             </a:fld>
             <a:endParaRPr lang="en-US" dirty="0"/>
           </a:p>
@@ -645,7 +645,7 @@
           <a:p>
             <a:fld id="{6464FF7A-8C0F-48D3-B78D-C256EBC8221F}" type="datetimeFigureOut">
               <a:rPr lang="en-US" smtClean="0"/>
-              <a:t>7/8/2016</a:t>
+              <a:t>7/9/2016</a:t>
             </a:fld>
             <a:endParaRPr lang="en-US" dirty="0"/>
           </a:p>
@@ -810,7 +810,7 @@
           <a:p>
             <a:fld id="{6464FF7A-8C0F-48D3-B78D-C256EBC8221F}" type="datetimeFigureOut">
               <a:rPr lang="en-US" smtClean="0"/>
-              <a:t>7/8/2016</a:t>
+              <a:t>7/9/2016</a:t>
             </a:fld>
             <a:endParaRPr lang="en-US" dirty="0"/>
           </a:p>
@@ -1051,7 +1051,7 @@
           <a:p>
             <a:fld id="{6464FF7A-8C0F-48D3-B78D-C256EBC8221F}" type="datetimeFigureOut">
               <a:rPr lang="en-US" smtClean="0"/>
-              <a:t>7/8/2016</a:t>
+              <a:t>7/9/2016</a:t>
             </a:fld>
             <a:endParaRPr lang="en-US" dirty="0"/>
           </a:p>
@@ -1334,7 +1334,7 @@
           <a:p>
             <a:fld id="{6464FF7A-8C0F-48D3-B78D-C256EBC8221F}" type="datetimeFigureOut">
               <a:rPr lang="en-US" smtClean="0"/>
-              <a:t>7/8/2016</a:t>
+              <a:t>7/9/2016</a:t>
             </a:fld>
             <a:endParaRPr lang="en-US" dirty="0"/>
           </a:p>
@@ -1763,7 +1763,7 @@
           <a:p>
             <a:fld id="{6464FF7A-8C0F-48D3-B78D-C256EBC8221F}" type="datetimeFigureOut">
               <a:rPr lang="en-US" smtClean="0"/>
-              <a:t>7/8/2016</a:t>
+              <a:t>7/9/2016</a:t>
             </a:fld>
             <a:endParaRPr lang="en-US" dirty="0"/>
           </a:p>
@@ -1876,7 +1876,7 @@
           <a:p>
             <a:fld id="{6464FF7A-8C0F-48D3-B78D-C256EBC8221F}" type="datetimeFigureOut">
               <a:rPr lang="en-US" smtClean="0"/>
-              <a:t>7/8/2016</a:t>
+              <a:t>7/9/2016</a:t>
             </a:fld>
             <a:endParaRPr lang="en-US" dirty="0"/>
           </a:p>
@@ -1966,7 +1966,7 @@
           <a:p>
             <a:fld id="{6464FF7A-8C0F-48D3-B78D-C256EBC8221F}" type="datetimeFigureOut">
               <a:rPr lang="en-US" smtClean="0"/>
-              <a:t>7/8/2016</a:t>
+              <a:t>7/9/2016</a:t>
             </a:fld>
             <a:endParaRPr lang="en-US" dirty="0"/>
           </a:p>
@@ -2155,7 +2155,7 @@
           <a:p>
             <a:fld id="{6464FF7A-8C0F-48D3-B78D-C256EBC8221F}" type="datetimeFigureOut">
               <a:rPr lang="en-US" smtClean="0"/>
-              <a:t>7/8/2016</a:t>
+              <a:t>7/9/2016</a:t>
             </a:fld>
             <a:endParaRPr lang="en-US" dirty="0"/>
           </a:p>
@@ -2473,7 +2473,7 @@
           <a:p>
             <a:fld id="{6464FF7A-8C0F-48D3-B78D-C256EBC8221F}" type="datetimeFigureOut">
               <a:rPr lang="en-US" smtClean="0"/>
-              <a:t>7/8/2016</a:t>
+              <a:t>7/9/2016</a:t>
             </a:fld>
             <a:endParaRPr lang="en-US" dirty="0"/>
           </a:p>
@@ -2852,7 +2852,7 @@
           <a:p>
             <a:fld id="{6464FF7A-8C0F-48D3-B78D-C256EBC8221F}" type="datetimeFigureOut">
               <a:rPr lang="en-US" smtClean="0"/>
-              <a:t>7/8/2016</a:t>
+              <a:t>7/9/2016</a:t>
             </a:fld>
             <a:endParaRPr lang="en-US" dirty="0"/>
           </a:p>
@@ -3307,6 +3307,48 @@
               <a:t>-all</a:t>
             </a:r>
           </a:p>
+          <a:p>
+            <a:pPr lvl="1"/>
+            <a:r>
+              <a:rPr lang="en-US" dirty="0">
+                <a:latin typeface="Courier New" panose="02070309020205020404" pitchFamily="49" charset="0"/>
+                <a:cs typeface="Courier New" panose="02070309020205020404" pitchFamily="49" charset="0"/>
+              </a:rPr>
+              <a:t>a</a:t>
+            </a:r>
+            <a:r>
+              <a:rPr lang="en-US" dirty="0" smtClean="0">
+                <a:latin typeface="Courier New" panose="02070309020205020404" pitchFamily="49" charset="0"/>
+                <a:cs typeface="Courier New" panose="02070309020205020404" pitchFamily="49" charset="0"/>
+              </a:rPr>
+              <a:t>ptitude install </a:t>
+            </a:r>
+            <a:r>
+              <a:rPr lang="en-US" dirty="0" err="1" smtClean="0">
+                <a:latin typeface="Courier New" panose="02070309020205020404" pitchFamily="49" charset="0"/>
+                <a:cs typeface="Courier New" panose="02070309020205020404" pitchFamily="49" charset="0"/>
+              </a:rPr>
+              <a:t>gedit</a:t>
+            </a:r>
+            <a:endParaRPr lang="en-US" dirty="0" smtClean="0">
+              <a:latin typeface="Courier New" panose="02070309020205020404" pitchFamily="49" charset="0"/>
+              <a:cs typeface="Courier New" panose="02070309020205020404" pitchFamily="49" charset="0"/>
+            </a:endParaRPr>
+          </a:p>
+          <a:p>
+            <a:pPr lvl="1"/>
+            <a:r>
+              <a:rPr lang="en-US" dirty="0" smtClean="0">
+                <a:latin typeface="Courier New" panose="02070309020205020404" pitchFamily="49" charset="0"/>
+                <a:cs typeface="Courier New" panose="02070309020205020404" pitchFamily="49" charset="0"/>
+              </a:rPr>
+              <a:t>exit</a:t>
+            </a:r>
+            <a:endParaRPr lang="en-US" dirty="0" smtClean="0">
+              <a:latin typeface="Courier New" panose="02070309020205020404" pitchFamily="49" charset="0"/>
+              <a:cs typeface="Courier New" panose="02070309020205020404" pitchFamily="49" charset="0"/>
+            </a:endParaRPr>
+          </a:p>
         </p:txBody>
       </p:sp>
     </p:spTree>
@@ -3442,8 +3484,45 @@
                 <a:latin typeface="Courier New" panose="02070309020205020404" pitchFamily="49" charset="0"/>
                 <a:cs typeface="Courier New" panose="02070309020205020404" pitchFamily="49" charset="0"/>
               </a:rPr>
-              <a:t>cd PBPK-workshop</a:t>
-            </a:r>
+              <a:t>cd </a:t>
+            </a:r>
+            <a:r>
+              <a:rPr lang="en-US" sz="1800" dirty="0" smtClean="0">
+                <a:latin typeface="Courier New" panose="02070309020205020404" pitchFamily="49" charset="0"/>
+                <a:cs typeface="Courier New" panose="02070309020205020404" pitchFamily="49" charset="0"/>
+              </a:rPr>
+              <a:t>PBPK-workshop</a:t>
+            </a:r>
+            <a:endParaRPr lang="en-US" sz="1800" dirty="0">
+              <a:latin typeface="Courier New" panose="02070309020205020404" pitchFamily="49" charset="0"/>
+              <a:cs typeface="Courier New" panose="02070309020205020404" pitchFamily="49" charset="0"/>
+            </a:endParaRPr>
+          </a:p>
+          <a:p>
+            <a:endParaRPr lang="en-US" dirty="0" smtClean="0">
+              <a:latin typeface="Courier New" panose="02070309020205020404" pitchFamily="49" charset="0"/>
+              <a:cs typeface="Courier New" panose="02070309020205020404" pitchFamily="49" charset="0"/>
+            </a:endParaRPr>
+          </a:p>
+          <a:p>
+            <a:r>
+              <a:rPr lang="en-US" dirty="0" smtClean="0">
+                <a:latin typeface="Courier New" panose="02070309020205020404" pitchFamily="49" charset="0"/>
+                <a:cs typeface="Courier New" panose="02070309020205020404" pitchFamily="49" charset="0"/>
+              </a:rPr>
+              <a:t>Take snapshot in </a:t>
+            </a:r>
+            <a:r>
+              <a:rPr lang="en-US" dirty="0" err="1" smtClean="0">
+                <a:latin typeface="Courier New" panose="02070309020205020404" pitchFamily="49" charset="0"/>
+                <a:cs typeface="Courier New" panose="02070309020205020404" pitchFamily="49" charset="0"/>
+              </a:rPr>
+              <a:t>VirtualBox</a:t>
+            </a:r>
+            <a:endParaRPr lang="en-US" dirty="0" smtClean="0">
+              <a:latin typeface="Courier New" panose="02070309020205020404" pitchFamily="49" charset="0"/>
+              <a:cs typeface="Courier New" panose="02070309020205020404" pitchFamily="49" charset="0"/>
+            </a:endParaRPr>
           </a:p>
         </p:txBody>
       </p:sp>
@@ -3545,6 +3624,13 @@
   <p:clrMapOvr>
     <a:masterClrMapping/>
   </p:clrMapOvr>
+  <p:timing>
+    <p:tnLst>
+      <p:par>
+        <p:cTn id="1" dur="indefinite" restart="never" nodeType="tmRoot"/>
+      </p:par>
+    </p:tnLst>
+  </p:timing>
 </p:sld>
 </file>
 
@@ -3790,6 +3876,13 @@
   <p:clrMapOvr>
     <a:masterClrMapping/>
   </p:clrMapOvr>
+  <p:timing>
+    <p:tnLst>
+      <p:par>
+        <p:cTn id="1" dur="indefinite" restart="never" nodeType="tmRoot"/>
+      </p:par>
+    </p:tnLst>
+  </p:timing>
 </p:sld>
 </file>
 
@@ -3886,20 +3979,16 @@
             </a:r>
             <a:r>
               <a:rPr lang="en-US" dirty="0"/>
-              <a:t> --global user.name "John Doe</a:t>
-            </a:r>
-            <a:r>
-              <a:rPr lang="en-US"/>
-              <a:t>" </a:t>
-            </a:r>
-            <a:endParaRPr lang="en-US" smtClean="0"/>
+              <a:t> --global user.name "John Doe" </a:t>
+            </a:r>
+            <a:endParaRPr lang="en-US" dirty="0" smtClean="0"/>
           </a:p>
           <a:p>
             <a:pPr marL="114300" indent="0">
               <a:buNone/>
             </a:pPr>
             <a:r>
-              <a:rPr lang="en-US" smtClean="0"/>
+              <a:rPr lang="en-US" dirty="0" smtClean="0"/>
               <a:t>$ </a:t>
             </a:r>
             <a:r>
@@ -4052,6 +4141,13 @@
   <p:clrMapOvr>
     <a:masterClrMapping/>
   </p:clrMapOvr>
+  <p:timing>
+    <p:tnLst>
+      <p:par>
+        <p:cTn id="1" dur="indefinite" restart="never" nodeType="tmRoot"/>
+      </p:par>
+    </p:tnLst>
+  </p:timing>
 </p:sld>
 </file>
 

</xml_diff>